<commit_message>
chap1..ok, chap2: reste 2.5.ethereum, transaction et blocs
</commit_message>
<xml_diff>
--- a/docs/figures/Nouveau Présentation Microsoft PowerPoint.pptx
+++ b/docs/figures/Nouveau Présentation Microsoft PowerPoint.pptx
@@ -244,7 +244,7 @@
           <a:p>
             <a:fld id="{497B6CEF-B38E-4BEE-905B-6E4AA97D29E7}" type="datetimeFigureOut">
               <a:rPr lang="en-US" smtClean="0"/>
-              <a:t>12/22/2024</a:t>
+              <a:t>2/13/2025</a:t>
             </a:fld>
             <a:endParaRPr lang="en-US"/>
           </a:p>
@@ -414,7 +414,7 @@
           <a:p>
             <a:fld id="{497B6CEF-B38E-4BEE-905B-6E4AA97D29E7}" type="datetimeFigureOut">
               <a:rPr lang="en-US" smtClean="0"/>
-              <a:t>12/22/2024</a:t>
+              <a:t>2/13/2025</a:t>
             </a:fld>
             <a:endParaRPr lang="en-US"/>
           </a:p>
@@ -594,7 +594,7 @@
           <a:p>
             <a:fld id="{497B6CEF-B38E-4BEE-905B-6E4AA97D29E7}" type="datetimeFigureOut">
               <a:rPr lang="en-US" smtClean="0"/>
-              <a:t>12/22/2024</a:t>
+              <a:t>2/13/2025</a:t>
             </a:fld>
             <a:endParaRPr lang="en-US"/>
           </a:p>
@@ -764,7 +764,7 @@
           <a:p>
             <a:fld id="{497B6CEF-B38E-4BEE-905B-6E4AA97D29E7}" type="datetimeFigureOut">
               <a:rPr lang="en-US" smtClean="0"/>
-              <a:t>12/22/2024</a:t>
+              <a:t>2/13/2025</a:t>
             </a:fld>
             <a:endParaRPr lang="en-US"/>
           </a:p>
@@ -1010,7 +1010,7 @@
           <a:p>
             <a:fld id="{497B6CEF-B38E-4BEE-905B-6E4AA97D29E7}" type="datetimeFigureOut">
               <a:rPr lang="en-US" smtClean="0"/>
-              <a:t>12/22/2024</a:t>
+              <a:t>2/13/2025</a:t>
             </a:fld>
             <a:endParaRPr lang="en-US"/>
           </a:p>
@@ -1242,7 +1242,7 @@
           <a:p>
             <a:fld id="{497B6CEF-B38E-4BEE-905B-6E4AA97D29E7}" type="datetimeFigureOut">
               <a:rPr lang="en-US" smtClean="0"/>
-              <a:t>12/22/2024</a:t>
+              <a:t>2/13/2025</a:t>
             </a:fld>
             <a:endParaRPr lang="en-US"/>
           </a:p>
@@ -1609,7 +1609,7 @@
           <a:p>
             <a:fld id="{497B6CEF-B38E-4BEE-905B-6E4AA97D29E7}" type="datetimeFigureOut">
               <a:rPr lang="en-US" smtClean="0"/>
-              <a:t>12/22/2024</a:t>
+              <a:t>2/13/2025</a:t>
             </a:fld>
             <a:endParaRPr lang="en-US"/>
           </a:p>
@@ -1727,7 +1727,7 @@
           <a:p>
             <a:fld id="{497B6CEF-B38E-4BEE-905B-6E4AA97D29E7}" type="datetimeFigureOut">
               <a:rPr lang="en-US" smtClean="0"/>
-              <a:t>12/22/2024</a:t>
+              <a:t>2/13/2025</a:t>
             </a:fld>
             <a:endParaRPr lang="en-US"/>
           </a:p>
@@ -1822,7 +1822,7 @@
           <a:p>
             <a:fld id="{497B6CEF-B38E-4BEE-905B-6E4AA97D29E7}" type="datetimeFigureOut">
               <a:rPr lang="en-US" smtClean="0"/>
-              <a:t>12/22/2024</a:t>
+              <a:t>2/13/2025</a:t>
             </a:fld>
             <a:endParaRPr lang="en-US"/>
           </a:p>
@@ -2099,7 +2099,7 @@
           <a:p>
             <a:fld id="{497B6CEF-B38E-4BEE-905B-6E4AA97D29E7}" type="datetimeFigureOut">
               <a:rPr lang="en-US" smtClean="0"/>
-              <a:t>12/22/2024</a:t>
+              <a:t>2/13/2025</a:t>
             </a:fld>
             <a:endParaRPr lang="en-US"/>
           </a:p>
@@ -2352,7 +2352,7 @@
           <a:p>
             <a:fld id="{497B6CEF-B38E-4BEE-905B-6E4AA97D29E7}" type="datetimeFigureOut">
               <a:rPr lang="en-US" smtClean="0"/>
-              <a:t>12/22/2024</a:t>
+              <a:t>2/13/2025</a:t>
             </a:fld>
             <a:endParaRPr lang="en-US"/>
           </a:p>
@@ -2565,7 +2565,7 @@
           <a:p>
             <a:fld id="{497B6CEF-B38E-4BEE-905B-6E4AA97D29E7}" type="datetimeFigureOut">
               <a:rPr lang="en-US" smtClean="0"/>
-              <a:t>12/22/2024</a:t>
+              <a:t>2/13/2025</a:t>
             </a:fld>
             <a:endParaRPr lang="en-US"/>
           </a:p>
@@ -3299,17 +3299,7 @@
                 <a:latin typeface="Times New Roman" panose="02020603050405020304" pitchFamily="18" charset="0"/>
                 <a:cs typeface="Times New Roman" panose="02020603050405020304" pitchFamily="18" charset="0"/>
               </a:rPr>
-              <a:t>: </a:t>
-            </a:r>
-            <a:r>
-              <a:rPr lang="fr-FR" sz="1600" smtClean="0">
-                <a:solidFill>
-                  <a:schemeClr val="bg1"/>
-                </a:solidFill>
-                <a:latin typeface="Times New Roman" panose="02020603050405020304" pitchFamily="18" charset="0"/>
-                <a:cs typeface="Times New Roman" panose="02020603050405020304" pitchFamily="18" charset="0"/>
-              </a:rPr>
-              <a:t>0001k</a:t>
+              <a:t>: 0001k</a:t>
             </a:r>
             <a:endParaRPr lang="en-US" sz="1600" dirty="0" smtClean="0">
               <a:solidFill>
@@ -4630,6 +4620,572 @@
           <a:chExt cx="0" cy="0"/>
         </a:xfrm>
       </p:grpSpPr>
+      <p:sp>
+        <p:nvSpPr>
+          <p:cNvPr id="2" name="Rectangle 1"/>
+          <p:cNvSpPr/>
+          <p:nvPr/>
+        </p:nvSpPr>
+        <p:spPr>
+          <a:xfrm>
+            <a:off x="2828041" y="1442301"/>
+            <a:ext cx="6014302" cy="2752628"/>
+          </a:xfrm>
+          <a:prstGeom prst="rect">
+            <a:avLst/>
+          </a:prstGeom>
+          <a:noFill/>
+          <a:ln w="28575">
+            <a:solidFill>
+              <a:schemeClr val="tx1"/>
+            </a:solidFill>
+          </a:ln>
+        </p:spPr>
+        <p:style>
+          <a:lnRef idx="2">
+            <a:schemeClr val="accent1">
+              <a:shade val="50000"/>
+            </a:schemeClr>
+          </a:lnRef>
+          <a:fillRef idx="1">
+            <a:schemeClr val="accent1"/>
+          </a:fillRef>
+          <a:effectRef idx="0">
+            <a:schemeClr val="accent1"/>
+          </a:effectRef>
+          <a:fontRef idx="minor">
+            <a:schemeClr val="lt1"/>
+          </a:fontRef>
+        </p:style>
+        <p:txBody>
+          <a:bodyPr rtlCol="0" anchor="ctr"/>
+          <a:lstStyle/>
+          <a:p>
+            <a:pPr algn="ctr"/>
+            <a:endParaRPr lang="en-US"/>
+          </a:p>
+        </p:txBody>
+      </p:sp>
+      <p:sp>
+        <p:nvSpPr>
+          <p:cNvPr id="3" name="Ellipse 2"/>
+          <p:cNvSpPr/>
+          <p:nvPr/>
+        </p:nvSpPr>
+        <p:spPr>
+          <a:xfrm>
+            <a:off x="2960016" y="1487467"/>
+            <a:ext cx="1395168" cy="565608"/>
+          </a:xfrm>
+          <a:prstGeom prst="ellipse">
+            <a:avLst/>
+          </a:prstGeom>
+          <a:noFill/>
+          <a:ln w="28575">
+            <a:solidFill>
+              <a:schemeClr val="tx1"/>
+            </a:solidFill>
+          </a:ln>
+        </p:spPr>
+        <p:style>
+          <a:lnRef idx="2">
+            <a:schemeClr val="accent1">
+              <a:shade val="50000"/>
+            </a:schemeClr>
+          </a:lnRef>
+          <a:fillRef idx="1">
+            <a:schemeClr val="accent1"/>
+          </a:fillRef>
+          <a:effectRef idx="0">
+            <a:schemeClr val="accent1"/>
+          </a:effectRef>
+          <a:fontRef idx="minor">
+            <a:schemeClr val="lt1"/>
+          </a:fontRef>
+        </p:style>
+        <p:txBody>
+          <a:bodyPr rtlCol="0" anchor="ctr"/>
+          <a:lstStyle/>
+          <a:p>
+            <a:pPr algn="ctr"/>
+            <a:r>
+              <a:rPr lang="fr-FR" b="1" dirty="0" smtClean="0">
+                <a:solidFill>
+                  <a:schemeClr val="tx1"/>
+                </a:solidFill>
+              </a:rPr>
+              <a:t>Address</a:t>
+            </a:r>
+            <a:endParaRPr lang="en-US" b="1" dirty="0">
+              <a:solidFill>
+                <a:schemeClr val="tx1"/>
+              </a:solidFill>
+            </a:endParaRPr>
+          </a:p>
+        </p:txBody>
+      </p:sp>
+      <p:sp>
+        <p:nvSpPr>
+          <p:cNvPr id="4" name="Rectangle 3"/>
+          <p:cNvSpPr/>
+          <p:nvPr/>
+        </p:nvSpPr>
+        <p:spPr>
+          <a:xfrm>
+            <a:off x="5731496" y="1932491"/>
+            <a:ext cx="2960016" cy="2121035"/>
+          </a:xfrm>
+          <a:prstGeom prst="rect">
+            <a:avLst/>
+          </a:prstGeom>
+          <a:noFill/>
+          <a:ln w="28575">
+            <a:solidFill>
+              <a:srgbClr val="0070C0"/>
+            </a:solidFill>
+          </a:ln>
+        </p:spPr>
+        <p:style>
+          <a:lnRef idx="2">
+            <a:schemeClr val="accent1">
+              <a:shade val="50000"/>
+            </a:schemeClr>
+          </a:lnRef>
+          <a:fillRef idx="1">
+            <a:schemeClr val="accent1"/>
+          </a:fillRef>
+          <a:effectRef idx="0">
+            <a:schemeClr val="accent1"/>
+          </a:effectRef>
+          <a:fontRef idx="minor">
+            <a:schemeClr val="lt1"/>
+          </a:fontRef>
+        </p:style>
+        <p:txBody>
+          <a:bodyPr rtlCol="0" anchor="ctr"/>
+          <a:lstStyle/>
+          <a:p>
+            <a:pPr algn="ctr"/>
+            <a:endParaRPr lang="en-US"/>
+          </a:p>
+        </p:txBody>
+      </p:sp>
+      <p:sp>
+        <p:nvSpPr>
+          <p:cNvPr id="5" name="Rectangle 4"/>
+          <p:cNvSpPr/>
+          <p:nvPr/>
+        </p:nvSpPr>
+        <p:spPr>
+          <a:xfrm>
+            <a:off x="5797485" y="2215300"/>
+            <a:ext cx="1244338" cy="377072"/>
+          </a:xfrm>
+          <a:prstGeom prst="rect">
+            <a:avLst/>
+          </a:prstGeom>
+        </p:spPr>
+        <p:style>
+          <a:lnRef idx="2">
+            <a:schemeClr val="accent1">
+              <a:shade val="50000"/>
+            </a:schemeClr>
+          </a:lnRef>
+          <a:fillRef idx="1">
+            <a:schemeClr val="accent1"/>
+          </a:fillRef>
+          <a:effectRef idx="0">
+            <a:schemeClr val="accent1"/>
+          </a:effectRef>
+          <a:fontRef idx="minor">
+            <a:schemeClr val="lt1"/>
+          </a:fontRef>
+        </p:style>
+        <p:txBody>
+          <a:bodyPr rtlCol="0" anchor="ctr"/>
+          <a:lstStyle/>
+          <a:p>
+            <a:pPr algn="ctr"/>
+            <a:r>
+              <a:rPr lang="fr-FR" b="1" dirty="0" smtClean="0"/>
+              <a:t>Nonce</a:t>
+            </a:r>
+            <a:endParaRPr lang="en-US" b="1" dirty="0"/>
+          </a:p>
+        </p:txBody>
+      </p:sp>
+      <p:sp>
+        <p:nvSpPr>
+          <p:cNvPr id="6" name="Rectangle 5"/>
+          <p:cNvSpPr/>
+          <p:nvPr/>
+        </p:nvSpPr>
+        <p:spPr>
+          <a:xfrm>
+            <a:off x="7126664" y="2215295"/>
+            <a:ext cx="1480007" cy="377072"/>
+          </a:xfrm>
+          <a:prstGeom prst="rect">
+            <a:avLst/>
+          </a:prstGeom>
+        </p:spPr>
+        <p:style>
+          <a:lnRef idx="2">
+            <a:schemeClr val="accent1">
+              <a:shade val="50000"/>
+            </a:schemeClr>
+          </a:lnRef>
+          <a:fillRef idx="1">
+            <a:schemeClr val="accent1"/>
+          </a:fillRef>
+          <a:effectRef idx="0">
+            <a:schemeClr val="accent1"/>
+          </a:effectRef>
+          <a:fontRef idx="minor">
+            <a:schemeClr val="lt1"/>
+          </a:fontRef>
+        </p:style>
+        <p:txBody>
+          <a:bodyPr rtlCol="0" anchor="ctr"/>
+          <a:lstStyle/>
+          <a:p>
+            <a:pPr algn="ctr"/>
+            <a:r>
+              <a:rPr lang="fr-FR" b="1" dirty="0" smtClean="0"/>
+              <a:t>Balance</a:t>
+            </a:r>
+            <a:endParaRPr lang="en-US" b="1" dirty="0"/>
+          </a:p>
+        </p:txBody>
+      </p:sp>
+      <p:sp>
+        <p:nvSpPr>
+          <p:cNvPr id="7" name="Rectangle 6"/>
+          <p:cNvSpPr/>
+          <p:nvPr/>
+        </p:nvSpPr>
+        <p:spPr>
+          <a:xfrm>
+            <a:off x="5797485" y="2748699"/>
+            <a:ext cx="2809185" cy="503544"/>
+          </a:xfrm>
+          <a:prstGeom prst="rect">
+            <a:avLst/>
+          </a:prstGeom>
+        </p:spPr>
+        <p:style>
+          <a:lnRef idx="2">
+            <a:schemeClr val="accent1">
+              <a:shade val="50000"/>
+            </a:schemeClr>
+          </a:lnRef>
+          <a:fillRef idx="1">
+            <a:schemeClr val="accent1"/>
+          </a:fillRef>
+          <a:effectRef idx="0">
+            <a:schemeClr val="accent1"/>
+          </a:effectRef>
+          <a:fontRef idx="minor">
+            <a:schemeClr val="lt1"/>
+          </a:fontRef>
+        </p:style>
+        <p:txBody>
+          <a:bodyPr rtlCol="0" anchor="ctr"/>
+          <a:lstStyle/>
+          <a:p>
+            <a:pPr algn="ctr"/>
+            <a:r>
+              <a:rPr lang="fr-FR" b="1" dirty="0" smtClean="0"/>
+              <a:t>CodeHash</a:t>
+            </a:r>
+            <a:endParaRPr lang="en-US" b="1" dirty="0"/>
+          </a:p>
+        </p:txBody>
+      </p:sp>
+      <p:sp>
+        <p:nvSpPr>
+          <p:cNvPr id="8" name="Rectangle 7"/>
+          <p:cNvSpPr/>
+          <p:nvPr/>
+        </p:nvSpPr>
+        <p:spPr>
+          <a:xfrm>
+            <a:off x="5797485" y="3399143"/>
+            <a:ext cx="2809185" cy="512976"/>
+          </a:xfrm>
+          <a:prstGeom prst="rect">
+            <a:avLst/>
+          </a:prstGeom>
+        </p:spPr>
+        <p:style>
+          <a:lnRef idx="2">
+            <a:schemeClr val="accent1">
+              <a:shade val="50000"/>
+            </a:schemeClr>
+          </a:lnRef>
+          <a:fillRef idx="1">
+            <a:schemeClr val="accent1"/>
+          </a:fillRef>
+          <a:effectRef idx="0">
+            <a:schemeClr val="accent1"/>
+          </a:effectRef>
+          <a:fontRef idx="minor">
+            <a:schemeClr val="lt1"/>
+          </a:fontRef>
+        </p:style>
+        <p:txBody>
+          <a:bodyPr rtlCol="0" anchor="ctr"/>
+          <a:lstStyle/>
+          <a:p>
+            <a:pPr algn="ctr"/>
+            <a:r>
+              <a:rPr lang="fr-FR" b="1" dirty="0" smtClean="0"/>
+              <a:t>StorageRoot</a:t>
+            </a:r>
+            <a:endParaRPr lang="en-US" b="1" dirty="0"/>
+          </a:p>
+        </p:txBody>
+      </p:sp>
+      <p:sp>
+        <p:nvSpPr>
+          <p:cNvPr id="9" name="Rectangle 8"/>
+          <p:cNvSpPr/>
+          <p:nvPr/>
+        </p:nvSpPr>
+        <p:spPr>
+          <a:xfrm>
+            <a:off x="5731496" y="1555419"/>
+            <a:ext cx="2960016" cy="377072"/>
+          </a:xfrm>
+          <a:prstGeom prst="rect">
+            <a:avLst/>
+          </a:prstGeom>
+          <a:ln w="28575"/>
+        </p:spPr>
+        <p:style>
+          <a:lnRef idx="2">
+            <a:schemeClr val="accent1">
+              <a:shade val="50000"/>
+            </a:schemeClr>
+          </a:lnRef>
+          <a:fillRef idx="1">
+            <a:schemeClr val="accent1"/>
+          </a:fillRef>
+          <a:effectRef idx="0">
+            <a:schemeClr val="accent1"/>
+          </a:effectRef>
+          <a:fontRef idx="minor">
+            <a:schemeClr val="lt1"/>
+          </a:fontRef>
+        </p:style>
+        <p:txBody>
+          <a:bodyPr rtlCol="0" anchor="ctr"/>
+          <a:lstStyle/>
+          <a:p>
+            <a:pPr algn="ctr"/>
+            <a:r>
+              <a:rPr lang="fr-FR" b="1" dirty="0" smtClean="0"/>
+              <a:t>Etat compte</a:t>
+            </a:r>
+            <a:endParaRPr lang="en-US" b="1" dirty="0"/>
+          </a:p>
+        </p:txBody>
+      </p:sp>
+      <p:sp>
+        <p:nvSpPr>
+          <p:cNvPr id="10" name="Rectangle 9"/>
+          <p:cNvSpPr/>
+          <p:nvPr/>
+        </p:nvSpPr>
+        <p:spPr>
+          <a:xfrm>
+            <a:off x="2828041" y="1065229"/>
+            <a:ext cx="6014302" cy="377072"/>
+          </a:xfrm>
+          <a:prstGeom prst="rect">
+            <a:avLst/>
+          </a:prstGeom>
+          <a:solidFill>
+            <a:schemeClr val="bg1">
+              <a:lumMod val="50000"/>
+            </a:schemeClr>
+          </a:solidFill>
+          <a:ln w="28575">
+            <a:solidFill>
+              <a:schemeClr val="tx1"/>
+            </a:solidFill>
+          </a:ln>
+        </p:spPr>
+        <p:style>
+          <a:lnRef idx="2">
+            <a:schemeClr val="accent1">
+              <a:shade val="50000"/>
+            </a:schemeClr>
+          </a:lnRef>
+          <a:fillRef idx="1">
+            <a:schemeClr val="accent1"/>
+          </a:fillRef>
+          <a:effectRef idx="0">
+            <a:schemeClr val="accent1"/>
+          </a:effectRef>
+          <a:fontRef idx="minor">
+            <a:schemeClr val="lt1"/>
+          </a:fontRef>
+        </p:style>
+        <p:txBody>
+          <a:bodyPr rtlCol="0" anchor="ctr"/>
+          <a:lstStyle/>
+          <a:p>
+            <a:pPr algn="ctr"/>
+            <a:r>
+              <a:rPr lang="fr-FR" b="1" dirty="0" smtClean="0"/>
+              <a:t>EOA ou CA</a:t>
+            </a:r>
+            <a:endParaRPr lang="en-US" b="1" dirty="0"/>
+          </a:p>
+        </p:txBody>
+      </p:sp>
+      <p:cxnSp>
+        <p:nvCxnSpPr>
+          <p:cNvPr id="12" name="Connecteur droit avec flèche 11"/>
+          <p:cNvCxnSpPr>
+            <a:stCxn id="3" idx="6"/>
+            <a:endCxn id="18" idx="1"/>
+          </p:cNvCxnSpPr>
+          <p:nvPr/>
+        </p:nvCxnSpPr>
+        <p:spPr>
+          <a:xfrm flipV="1">
+            <a:off x="4355184" y="1751417"/>
+            <a:ext cx="1376312" cy="18854"/>
+          </a:xfrm>
+          <a:prstGeom prst="straightConnector1">
+            <a:avLst/>
+          </a:prstGeom>
+          <a:ln w="38100">
+            <a:solidFill>
+              <a:schemeClr val="tx1"/>
+            </a:solidFill>
+            <a:prstDash val="sysDash"/>
+            <a:tailEnd type="triangle"/>
+          </a:ln>
+        </p:spPr>
+        <p:style>
+          <a:lnRef idx="1">
+            <a:schemeClr val="accent1"/>
+          </a:lnRef>
+          <a:fillRef idx="0">
+            <a:schemeClr val="accent1"/>
+          </a:fillRef>
+          <a:effectRef idx="0">
+            <a:schemeClr val="accent1"/>
+          </a:effectRef>
+          <a:fontRef idx="minor">
+            <a:schemeClr val="tx1"/>
+          </a:fontRef>
+        </p:style>
+      </p:cxnSp>
+      <p:sp>
+        <p:nvSpPr>
+          <p:cNvPr id="17" name="Rectangle 16"/>
+          <p:cNvSpPr/>
+          <p:nvPr/>
+        </p:nvSpPr>
+        <p:spPr>
+          <a:xfrm>
+            <a:off x="5731496" y="1939953"/>
+            <a:ext cx="2960016" cy="2121035"/>
+          </a:xfrm>
+          <a:prstGeom prst="rect">
+            <a:avLst/>
+          </a:prstGeom>
+          <a:noFill/>
+          <a:ln w="28575">
+            <a:solidFill>
+              <a:schemeClr val="tx1"/>
+            </a:solidFill>
+          </a:ln>
+        </p:spPr>
+        <p:style>
+          <a:lnRef idx="2">
+            <a:schemeClr val="accent1">
+              <a:shade val="50000"/>
+            </a:schemeClr>
+          </a:lnRef>
+          <a:fillRef idx="1">
+            <a:schemeClr val="accent1"/>
+          </a:fillRef>
+          <a:effectRef idx="0">
+            <a:schemeClr val="accent1"/>
+          </a:effectRef>
+          <a:fontRef idx="minor">
+            <a:schemeClr val="lt1"/>
+          </a:fontRef>
+        </p:style>
+        <p:txBody>
+          <a:bodyPr rtlCol="0" anchor="ctr"/>
+          <a:lstStyle/>
+          <a:p>
+            <a:pPr algn="ctr"/>
+            <a:endParaRPr lang="en-US"/>
+          </a:p>
+        </p:txBody>
+      </p:sp>
+      <p:sp>
+        <p:nvSpPr>
+          <p:cNvPr id="18" name="Rectangle 17"/>
+          <p:cNvSpPr/>
+          <p:nvPr/>
+        </p:nvSpPr>
+        <p:spPr>
+          <a:xfrm>
+            <a:off x="5731496" y="1562881"/>
+            <a:ext cx="2960016" cy="377072"/>
+          </a:xfrm>
+          <a:prstGeom prst="rect">
+            <a:avLst/>
+          </a:prstGeom>
+          <a:solidFill>
+            <a:schemeClr val="tx1">
+              <a:lumMod val="50000"/>
+              <a:lumOff val="50000"/>
+            </a:schemeClr>
+          </a:solidFill>
+          <a:ln w="28575">
+            <a:solidFill>
+              <a:schemeClr val="tx1"/>
+            </a:solidFill>
+          </a:ln>
+        </p:spPr>
+        <p:style>
+          <a:lnRef idx="2">
+            <a:schemeClr val="accent1">
+              <a:shade val="50000"/>
+            </a:schemeClr>
+          </a:lnRef>
+          <a:fillRef idx="1">
+            <a:schemeClr val="accent1"/>
+          </a:fillRef>
+          <a:effectRef idx="0">
+            <a:schemeClr val="accent1"/>
+          </a:effectRef>
+          <a:fontRef idx="minor">
+            <a:schemeClr val="lt1"/>
+          </a:fontRef>
+        </p:style>
+        <p:txBody>
+          <a:bodyPr rtlCol="0" anchor="ctr"/>
+          <a:lstStyle/>
+          <a:p>
+            <a:pPr algn="ctr"/>
+            <a:r>
+              <a:rPr lang="fr-FR" b="1" dirty="0" smtClean="0"/>
+              <a:t>Etat compte</a:t>
+            </a:r>
+            <a:endParaRPr lang="en-US" b="1" dirty="0"/>
+          </a:p>
+        </p:txBody>
+      </p:sp>
     </p:spTree>
     <p:extLst>
       <p:ext uri="{BB962C8B-B14F-4D97-AF65-F5344CB8AC3E}">

</xml_diff>